<commit_message>
Added idone and mouse presentations
</commit_message>
<xml_diff>
--- a/assets/files/Projects/mes/mes.pptx
+++ b/assets/files/Projects/mes/mes.pptx
@@ -5,16 +5,18 @@
     <p:sldMasterId id="2147483658" r:id="rId4"/>
   </p:sldMasterIdLst>
   <p:notesMasterIdLst>
-    <p:notesMasterId r:id="rId9"/>
+    <p:notesMasterId r:id="rId11"/>
   </p:notesMasterIdLst>
   <p:handoutMasterIdLst>
-    <p:handoutMasterId r:id="rId10"/>
+    <p:handoutMasterId r:id="rId12"/>
   </p:handoutMasterIdLst>
   <p:sldIdLst>
     <p:sldId id="350" r:id="rId5"/>
     <p:sldId id="361" r:id="rId6"/>
     <p:sldId id="362" r:id="rId7"/>
-    <p:sldId id="354" r:id="rId8"/>
+    <p:sldId id="363" r:id="rId8"/>
+    <p:sldId id="364" r:id="rId9"/>
+    <p:sldId id="354" r:id="rId10"/>
   </p:sldIdLst>
   <p:sldSz cx="12192000" cy="6858000"/>
   <p:notesSz cx="6858000" cy="9144000"/>
@@ -366,7 +368,7 @@
             <a:pPr rtl="0"/>
             <a:fld id="{AD5349E3-2257-46A2-87AA-98208788B886}" type="datetime1">
               <a:rPr lang="it-IT" noProof="0" smtClean="0"/>
-              <a:t>20/09/2023</a:t>
+              <a:t>21/09/2023</a:t>
             </a:fld>
             <a:endParaRPr lang="it-IT" noProof="0"/>
           </a:p>
@@ -967,6 +969,176 @@
     </p:spTree>
     <p:extLst>
       <p:ext uri="{BB962C8B-B14F-4D97-AF65-F5344CB8AC3E}">
+        <p14:creationId xmlns:p14="http://schemas.microsoft.com/office/powerpoint/2010/main" val="2603954959"/>
+      </p:ext>
+    </p:extLst>
+  </p:cSld>
+  <p:clrMapOvr>
+    <a:masterClrMapping/>
+  </p:clrMapOvr>
+</p:notes>
+</file>
+
+<file path=ppt/notesSlides/notesSlide5.xml><?xml version="1.0" encoding="utf-8"?>
+<p:notes xmlns:a="http://schemas.openxmlformats.org/drawingml/2006/main" xmlns:r="http://schemas.openxmlformats.org/officeDocument/2006/relationships" xmlns:p="http://schemas.openxmlformats.org/presentationml/2006/main">
+  <p:cSld>
+    <p:spTree>
+      <p:nvGrpSpPr>
+        <p:cNvPr id="1" name=""/>
+        <p:cNvGrpSpPr/>
+        <p:nvPr/>
+      </p:nvGrpSpPr>
+      <p:grpSpPr>
+        <a:xfrm>
+          <a:off x="0" y="0"/>
+          <a:ext cx="0" cy="0"/>
+          <a:chOff x="0" y="0"/>
+          <a:chExt cx="0" cy="0"/>
+        </a:xfrm>
+      </p:grpSpPr>
+      <p:sp>
+        <p:nvSpPr>
+          <p:cNvPr id="2" name="Segnaposto immagine diapositiva 1"/>
+          <p:cNvSpPr>
+            <a:spLocks noGrp="1" noRot="1" noChangeAspect="1"/>
+          </p:cNvSpPr>
+          <p:nvPr>
+            <p:ph type="sldImg"/>
+          </p:nvPr>
+        </p:nvSpPr>
+        <p:spPr/>
+      </p:sp>
+      <p:sp>
+        <p:nvSpPr>
+          <p:cNvPr id="3" name="Segnaposto note 2"/>
+          <p:cNvSpPr>
+            <a:spLocks noGrp="1"/>
+          </p:cNvSpPr>
+          <p:nvPr>
+            <p:ph type="body" idx="1"/>
+          </p:nvPr>
+        </p:nvSpPr>
+        <p:spPr/>
+        <p:txBody>
+          <a:bodyPr/>
+          <a:lstStyle/>
+          <a:p>
+            <a:endParaRPr lang="it-IT" dirty="0"/>
+          </a:p>
+        </p:txBody>
+      </p:sp>
+      <p:sp>
+        <p:nvSpPr>
+          <p:cNvPr id="4" name="Segnaposto numero diapositiva 3"/>
+          <p:cNvSpPr>
+            <a:spLocks noGrp="1"/>
+          </p:cNvSpPr>
+          <p:nvPr>
+            <p:ph type="sldNum" sz="quarter" idx="5"/>
+          </p:nvPr>
+        </p:nvSpPr>
+        <p:spPr/>
+        <p:txBody>
+          <a:bodyPr/>
+          <a:lstStyle/>
+          <a:p>
+            <a:pPr rtl="0"/>
+            <a:fld id="{A89C7E07-3C67-C64C-8DA0-0404F6303970}" type="slidenum">
+              <a:rPr lang="it-IT" smtClean="0"/>
+              <a:t>5</a:t>
+            </a:fld>
+            <a:endParaRPr lang="it-IT"/>
+          </a:p>
+        </p:txBody>
+      </p:sp>
+    </p:spTree>
+    <p:extLst>
+      <p:ext uri="{BB962C8B-B14F-4D97-AF65-F5344CB8AC3E}">
+        <p14:creationId xmlns:p14="http://schemas.microsoft.com/office/powerpoint/2010/main" val="932821914"/>
+      </p:ext>
+    </p:extLst>
+  </p:cSld>
+  <p:clrMapOvr>
+    <a:masterClrMapping/>
+  </p:clrMapOvr>
+</p:notes>
+</file>
+
+<file path=ppt/notesSlides/notesSlide6.xml><?xml version="1.0" encoding="utf-8"?>
+<p:notes xmlns:a="http://schemas.openxmlformats.org/drawingml/2006/main" xmlns:r="http://schemas.openxmlformats.org/officeDocument/2006/relationships" xmlns:p="http://schemas.openxmlformats.org/presentationml/2006/main">
+  <p:cSld>
+    <p:spTree>
+      <p:nvGrpSpPr>
+        <p:cNvPr id="1" name=""/>
+        <p:cNvGrpSpPr/>
+        <p:nvPr/>
+      </p:nvGrpSpPr>
+      <p:grpSpPr>
+        <a:xfrm>
+          <a:off x="0" y="0"/>
+          <a:ext cx="0" cy="0"/>
+          <a:chOff x="0" y="0"/>
+          <a:chExt cx="0" cy="0"/>
+        </a:xfrm>
+      </p:grpSpPr>
+      <p:sp>
+        <p:nvSpPr>
+          <p:cNvPr id="2" name="Segnaposto immagine diapositiva 1"/>
+          <p:cNvSpPr>
+            <a:spLocks noGrp="1" noRot="1" noChangeAspect="1"/>
+          </p:cNvSpPr>
+          <p:nvPr>
+            <p:ph type="sldImg"/>
+          </p:nvPr>
+        </p:nvSpPr>
+        <p:spPr/>
+      </p:sp>
+      <p:sp>
+        <p:nvSpPr>
+          <p:cNvPr id="3" name="Segnaposto note 2"/>
+          <p:cNvSpPr>
+            <a:spLocks noGrp="1"/>
+          </p:cNvSpPr>
+          <p:nvPr>
+            <p:ph type="body" idx="1"/>
+          </p:nvPr>
+        </p:nvSpPr>
+        <p:spPr/>
+        <p:txBody>
+          <a:bodyPr/>
+          <a:lstStyle/>
+          <a:p>
+            <a:endParaRPr lang="it-IT" dirty="0"/>
+          </a:p>
+        </p:txBody>
+      </p:sp>
+      <p:sp>
+        <p:nvSpPr>
+          <p:cNvPr id="4" name="Segnaposto numero diapositiva 3"/>
+          <p:cNvSpPr>
+            <a:spLocks noGrp="1"/>
+          </p:cNvSpPr>
+          <p:nvPr>
+            <p:ph type="sldNum" sz="quarter" idx="5"/>
+          </p:nvPr>
+        </p:nvSpPr>
+        <p:spPr/>
+        <p:txBody>
+          <a:bodyPr/>
+          <a:lstStyle/>
+          <a:p>
+            <a:pPr rtl="0"/>
+            <a:fld id="{A89C7E07-3C67-C64C-8DA0-0404F6303970}" type="slidenum">
+              <a:rPr lang="it-IT" smtClean="0"/>
+              <a:t>6</a:t>
+            </a:fld>
+            <a:endParaRPr lang="it-IT"/>
+          </a:p>
+        </p:txBody>
+      </p:sp>
+    </p:spTree>
+    <p:extLst>
+      <p:ext uri="{BB962C8B-B14F-4D97-AF65-F5344CB8AC3E}">
         <p14:creationId xmlns:p14="http://schemas.microsoft.com/office/powerpoint/2010/main" val="716498680"/>
       </p:ext>
     </p:extLst>
@@ -2298,7 +2470,7 @@
               <a:rPr lang="it-IT" noProof="0" smtClean="0">
                 <a:latin typeface="+mn-lt"/>
               </a:rPr>
-              <a:t>20 settembre 2023</a:t>
+              <a:t>21 settembre 2023</a:t>
             </a:fld>
             <a:endParaRPr lang="it-IT" noProof="0" dirty="0">
               <a:latin typeface="+mn-lt"/>
@@ -3434,7 +3606,7 @@
               <a:rPr lang="it-IT" noProof="0" smtClean="0">
                 <a:latin typeface="+mn-lt"/>
               </a:rPr>
-              <a:t>20 settembre 2023</a:t>
+              <a:t>21 settembre 2023</a:t>
             </a:fld>
             <a:endParaRPr lang="it-IT" noProof="0" dirty="0">
               <a:latin typeface="+mn-lt"/>
@@ -4569,7 +4741,7 @@
               <a:rPr lang="it-IT" noProof="0" smtClean="0">
                 <a:latin typeface="+mn-lt"/>
               </a:rPr>
-              <a:t>20 settembre 2023</a:t>
+              <a:t>21 settembre 2023</a:t>
             </a:fld>
             <a:endParaRPr lang="it-IT" noProof="0" dirty="0">
               <a:latin typeface="+mn-lt"/>
@@ -6881,7 +7053,7 @@
               <a:rPr lang="it-IT" noProof="0" smtClean="0">
                 <a:latin typeface="+mn-lt"/>
               </a:rPr>
-              <a:t>20 settembre 2023</a:t>
+              <a:t>21 settembre 2023</a:t>
             </a:fld>
             <a:endParaRPr lang="it-IT" noProof="0" dirty="0">
               <a:latin typeface="+mn-lt"/>
@@ -7523,7 +7695,7 @@
               <a:rPr lang="it-IT" noProof="0" smtClean="0">
                 <a:latin typeface="+mn-lt"/>
               </a:rPr>
-              <a:t>20 settembre 2023</a:t>
+              <a:t>21 settembre 2023</a:t>
             </a:fld>
             <a:endParaRPr lang="it-IT" noProof="0" dirty="0">
               <a:latin typeface="+mn-lt"/>
@@ -8300,7 +8472,7 @@
               <a:rPr lang="it-IT" noProof="0" smtClean="0">
                 <a:latin typeface="+mn-lt"/>
               </a:rPr>
-              <a:t>20 settembre 2023</a:t>
+              <a:t>21 settembre 2023</a:t>
             </a:fld>
             <a:endParaRPr lang="it-IT" noProof="0">
               <a:latin typeface="+mn-lt"/>
@@ -8568,7 +8740,7 @@
               <a:rPr lang="it-IT" noProof="0" smtClean="0">
                 <a:latin typeface="+mn-lt"/>
               </a:rPr>
-              <a:t>20 settembre 2023</a:t>
+              <a:t>21 settembre 2023</a:t>
             </a:fld>
             <a:endParaRPr lang="it-IT" noProof="0">
               <a:latin typeface="+mn-lt"/>
@@ -11518,7 +11690,7 @@
               <a:rPr lang="it-IT" noProof="0" smtClean="0">
                 <a:latin typeface="+mn-lt"/>
               </a:rPr>
-              <a:t>20 settembre 2023</a:t>
+              <a:t>21 settembre 2023</a:t>
             </a:fld>
             <a:endParaRPr lang="it-IT" noProof="0" dirty="0">
               <a:latin typeface="+mn-lt"/>
@@ -12695,7 +12867,7 @@
               <a:rPr lang="it-IT" noProof="0" smtClean="0">
                 <a:latin typeface="+mn-lt"/>
               </a:rPr>
-              <a:t>20 settembre 2023</a:t>
+              <a:t>21 settembre 2023</a:t>
             </a:fld>
             <a:endParaRPr lang="it-IT" noProof="0">
               <a:latin typeface="+mn-lt"/>
@@ -13014,7 +13186,7 @@
               <a:rPr lang="it-IT" noProof="0" smtClean="0">
                 <a:latin typeface="+mn-lt"/>
               </a:rPr>
-              <a:t>20 settembre 2023</a:t>
+              <a:t>21 settembre 2023</a:t>
             </a:fld>
             <a:endParaRPr lang="it-IT" noProof="0">
               <a:latin typeface="+mn-lt"/>
@@ -14015,14 +14187,18 @@
         </p:spPr>
         <p:txBody>
           <a:bodyPr rtlCol="0">
-            <a:normAutofit fontScale="90000"/>
+            <a:normAutofit/>
           </a:bodyPr>
           <a:lstStyle/>
           <a:p>
             <a:pPr rtl="0"/>
             <a:r>
+              <a:rPr lang="it-IT" dirty="0"/>
+              <a:t>One system, </a:t>
+            </a:r>
+            <a:r>
               <a:rPr lang="it-IT" dirty="0" err="1"/>
-              <a:t>Different</a:t>
+              <a:t>many</a:t>
             </a:r>
             <a:r>
               <a:rPr lang="it-IT" dirty="0"/>
@@ -14032,18 +14208,7 @@
               <a:rPr lang="it-IT" dirty="0" err="1"/>
               <a:t>interfaces</a:t>
             </a:r>
-            <a:r>
-              <a:rPr lang="it-IT" dirty="0"/>
-              <a:t> for </a:t>
-            </a:r>
-            <a:r>
-              <a:rPr lang="it-IT" dirty="0" err="1"/>
-              <a:t>different</a:t>
-            </a:r>
-            <a:r>
-              <a:rPr lang="it-IT" dirty="0"/>
-              <a:t> users</a:t>
-            </a:r>
+            <a:endParaRPr lang="it-IT" dirty="0"/>
           </a:p>
         </p:txBody>
       </p:sp>
@@ -14352,6 +14517,1289 @@
 </file>
 
 <file path=ppt/slides/slide4.xml><?xml version="1.0" encoding="utf-8"?>
+<p:sld xmlns:a="http://schemas.openxmlformats.org/drawingml/2006/main" xmlns:r="http://schemas.openxmlformats.org/officeDocument/2006/relationships" xmlns:p="http://schemas.openxmlformats.org/presentationml/2006/main">
+  <p:cSld>
+    <p:spTree>
+      <p:nvGrpSpPr>
+        <p:cNvPr id="1" name=""/>
+        <p:cNvGrpSpPr/>
+        <p:nvPr/>
+      </p:nvGrpSpPr>
+      <p:grpSpPr>
+        <a:xfrm>
+          <a:off x="0" y="0"/>
+          <a:ext cx="0" cy="0"/>
+          <a:chOff x="0" y="0"/>
+          <a:chExt cx="0" cy="0"/>
+        </a:xfrm>
+      </p:grpSpPr>
+      <p:sp>
+        <p:nvSpPr>
+          <p:cNvPr id="3" name="Titolo 2">
+            <a:extLst>
+              <a:ext uri="{FF2B5EF4-FFF2-40B4-BE49-F238E27FC236}">
+                <a16:creationId xmlns:a16="http://schemas.microsoft.com/office/drawing/2014/main" id="{1353F689-2E51-BF4F-AE47-7CEB7CC4C52A}"/>
+              </a:ext>
+            </a:extLst>
+          </p:cNvPr>
+          <p:cNvSpPr>
+            <a:spLocks noGrp="1"/>
+          </p:cNvSpPr>
+          <p:nvPr>
+            <p:ph type="title"/>
+          </p:nvPr>
+        </p:nvSpPr>
+        <p:spPr>
+          <a:xfrm>
+            <a:off x="964023" y="879063"/>
+            <a:ext cx="9290320" cy="610863"/>
+          </a:xfrm>
+        </p:spPr>
+        <p:txBody>
+          <a:bodyPr rtlCol="0">
+            <a:normAutofit/>
+          </a:bodyPr>
+          <a:lstStyle/>
+          <a:p>
+            <a:pPr rtl="0"/>
+            <a:r>
+              <a:rPr lang="it-IT" dirty="0" err="1"/>
+              <a:t>What</a:t>
+            </a:r>
+            <a:r>
+              <a:rPr lang="it-IT" dirty="0"/>
+              <a:t> </a:t>
+            </a:r>
+            <a:r>
+              <a:rPr lang="it-IT" dirty="0" err="1"/>
+              <a:t>does</a:t>
+            </a:r>
+            <a:r>
+              <a:rPr lang="it-IT" dirty="0"/>
+              <a:t> MES do?</a:t>
+            </a:r>
+          </a:p>
+        </p:txBody>
+      </p:sp>
+      <p:sp>
+        <p:nvSpPr>
+          <p:cNvPr id="7" name="Segnaposto numero diapositiva 6">
+            <a:extLst>
+              <a:ext uri="{FF2B5EF4-FFF2-40B4-BE49-F238E27FC236}">
+                <a16:creationId xmlns:a16="http://schemas.microsoft.com/office/drawing/2014/main" id="{F37669F0-EA6D-6B46-AF0E-A9C2D1F223DB}"/>
+              </a:ext>
+            </a:extLst>
+          </p:cNvPr>
+          <p:cNvSpPr>
+            <a:spLocks noGrp="1"/>
+          </p:cNvSpPr>
+          <p:nvPr>
+            <p:ph type="sldNum" sz="quarter" idx="16"/>
+          </p:nvPr>
+        </p:nvSpPr>
+        <p:spPr>
+          <a:xfrm>
+            <a:off x="971550" y="6332220"/>
+            <a:ext cx="523240" cy="247651"/>
+          </a:xfrm>
+        </p:spPr>
+        <p:txBody>
+          <a:bodyPr rtlCol="0"/>
+          <a:lstStyle/>
+          <a:p>
+            <a:pPr rtl="0"/>
+            <a:fld id="{294A09A9-5501-47C1-A89A-A340965A2BE2}" type="slidenum">
+              <a:rPr lang="it-IT" smtClean="0"/>
+              <a:pPr rtl="0"/>
+              <a:t>4</a:t>
+            </a:fld>
+            <a:endParaRPr lang="it-IT"/>
+          </a:p>
+        </p:txBody>
+      </p:sp>
+      <p:pic>
+        <p:nvPicPr>
+          <p:cNvPr id="6" name="Immagine 5" descr="Immagine che contiene schermata, Policromia, Elementi grafici, Rettangolo&#10;&#10;Descrizione generata automaticamente">
+            <a:extLst>
+              <a:ext uri="{FF2B5EF4-FFF2-40B4-BE49-F238E27FC236}">
+                <a16:creationId xmlns:a16="http://schemas.microsoft.com/office/drawing/2014/main" id="{A2D4E090-FE21-73F6-310B-3EE758E9AC0F}"/>
+              </a:ext>
+            </a:extLst>
+          </p:cNvPr>
+          <p:cNvPicPr>
+            <a:picLocks noChangeAspect="1"/>
+          </p:cNvPicPr>
+          <p:nvPr/>
+        </p:nvPicPr>
+        <p:blipFill>
+          <a:blip r:embed="rId3">
+            <a:extLst>
+              <a:ext uri="{28A0092B-C50C-407E-A947-70E740481C1C}">
+                <a14:useLocalDpi xmlns:a14="http://schemas.microsoft.com/office/drawing/2010/main" val="0"/>
+              </a:ext>
+            </a:extLst>
+          </a:blip>
+          <a:stretch>
+            <a:fillRect/>
+          </a:stretch>
+        </p:blipFill>
+        <p:spPr>
+          <a:xfrm>
+            <a:off x="10901412" y="2661745"/>
+            <a:ext cx="894526" cy="894526"/>
+          </a:xfrm>
+          <a:prstGeom prst="rect">
+            <a:avLst/>
+          </a:prstGeom>
+        </p:spPr>
+      </p:pic>
+      <p:pic>
+        <p:nvPicPr>
+          <p:cNvPr id="13" name="Immagine 12" descr="Immagine che contiene ingranaggio, cerchio, Elementi grafici, schermata&#10;&#10;Descrizione generata automaticamente">
+            <a:extLst>
+              <a:ext uri="{FF2B5EF4-FFF2-40B4-BE49-F238E27FC236}">
+                <a16:creationId xmlns:a16="http://schemas.microsoft.com/office/drawing/2014/main" id="{0E4C351C-7846-E293-A7A8-29886538AF11}"/>
+              </a:ext>
+            </a:extLst>
+          </p:cNvPr>
+          <p:cNvPicPr>
+            <a:picLocks noChangeAspect="1"/>
+          </p:cNvPicPr>
+          <p:nvPr/>
+        </p:nvPicPr>
+        <p:blipFill>
+          <a:blip r:embed="rId4">
+            <a:extLst>
+              <a:ext uri="{28A0092B-C50C-407E-A947-70E740481C1C}">
+                <a14:useLocalDpi xmlns:a14="http://schemas.microsoft.com/office/drawing/2010/main" val="0"/>
+              </a:ext>
+            </a:extLst>
+          </a:blip>
+          <a:stretch>
+            <a:fillRect/>
+          </a:stretch>
+        </p:blipFill>
+        <p:spPr>
+          <a:xfrm>
+            <a:off x="2668591" y="2456387"/>
+            <a:ext cx="1064610" cy="1064610"/>
+          </a:xfrm>
+          <a:prstGeom prst="rect">
+            <a:avLst/>
+          </a:prstGeom>
+        </p:spPr>
+      </p:pic>
+      <p:pic>
+        <p:nvPicPr>
+          <p:cNvPr id="4" name="Immagine 3" descr="Immagine che contiene cerchio, schermata, cartone animato, orologio&#10;&#10;Descrizione generata automaticamente">
+            <a:extLst>
+              <a:ext uri="{FF2B5EF4-FFF2-40B4-BE49-F238E27FC236}">
+                <a16:creationId xmlns:a16="http://schemas.microsoft.com/office/drawing/2014/main" id="{FD452C43-D666-E573-1639-A3A26E16E279}"/>
+              </a:ext>
+            </a:extLst>
+          </p:cNvPr>
+          <p:cNvPicPr>
+            <a:picLocks noChangeAspect="1"/>
+          </p:cNvPicPr>
+          <p:nvPr/>
+        </p:nvPicPr>
+        <p:blipFill>
+          <a:blip r:embed="rId5">
+            <a:extLst>
+              <a:ext uri="{28A0092B-C50C-407E-A947-70E740481C1C}">
+                <a14:useLocalDpi xmlns:a14="http://schemas.microsoft.com/office/drawing/2010/main" val="0"/>
+              </a:ext>
+            </a:extLst>
+          </a:blip>
+          <a:stretch>
+            <a:fillRect/>
+          </a:stretch>
+        </p:blipFill>
+        <p:spPr>
+          <a:xfrm>
+            <a:off x="9503946" y="2626936"/>
+            <a:ext cx="929335" cy="929335"/>
+          </a:xfrm>
+          <a:prstGeom prst="rect">
+            <a:avLst/>
+          </a:prstGeom>
+        </p:spPr>
+      </p:pic>
+      <p:sp>
+        <p:nvSpPr>
+          <p:cNvPr id="16" name="CasellaDiTesto 15">
+            <a:extLst>
+              <a:ext uri="{FF2B5EF4-FFF2-40B4-BE49-F238E27FC236}">
+                <a16:creationId xmlns:a16="http://schemas.microsoft.com/office/drawing/2014/main" id="{381F6416-9A10-DD92-58B7-5D666D488075}"/>
+              </a:ext>
+            </a:extLst>
+          </p:cNvPr>
+          <p:cNvSpPr txBox="1"/>
+          <p:nvPr/>
+        </p:nvSpPr>
+        <p:spPr>
+          <a:xfrm>
+            <a:off x="9331163" y="3859995"/>
+            <a:ext cx="1274899" cy="1138773"/>
+          </a:xfrm>
+          <a:prstGeom prst="rect">
+            <a:avLst/>
+          </a:prstGeom>
+          <a:noFill/>
+        </p:spPr>
+        <p:txBody>
+          <a:bodyPr wrap="square" rtlCol="0">
+            <a:spAutoFit/>
+          </a:bodyPr>
+          <a:lstStyle/>
+          <a:p>
+            <a:pPr algn="ctr"/>
+            <a:r>
+              <a:rPr lang="en-US" sz="1600" dirty="0">
+                <a:solidFill>
+                  <a:schemeClr val="bg1"/>
+                </a:solidFill>
+              </a:rPr>
+              <a:t>Production delays tracking</a:t>
+            </a:r>
+          </a:p>
+          <a:p>
+            <a:pPr algn="ctr"/>
+            <a:endParaRPr lang="en-US" sz="2000" dirty="0"/>
+          </a:p>
+        </p:txBody>
+      </p:sp>
+      <p:sp>
+        <p:nvSpPr>
+          <p:cNvPr id="17" name="CasellaDiTesto 16">
+            <a:extLst>
+              <a:ext uri="{FF2B5EF4-FFF2-40B4-BE49-F238E27FC236}">
+                <a16:creationId xmlns:a16="http://schemas.microsoft.com/office/drawing/2014/main" id="{C7C4EC91-A9A8-14C6-7BAA-02364A1049C8}"/>
+              </a:ext>
+            </a:extLst>
+          </p:cNvPr>
+          <p:cNvSpPr txBox="1"/>
+          <p:nvPr/>
+        </p:nvSpPr>
+        <p:spPr>
+          <a:xfrm>
+            <a:off x="10711225" y="4062283"/>
+            <a:ext cx="1274899" cy="646331"/>
+          </a:xfrm>
+          <a:prstGeom prst="rect">
+            <a:avLst/>
+          </a:prstGeom>
+          <a:noFill/>
+        </p:spPr>
+        <p:txBody>
+          <a:bodyPr wrap="square" rtlCol="0">
+            <a:spAutoFit/>
+          </a:bodyPr>
+          <a:lstStyle/>
+          <a:p>
+            <a:pPr algn="ctr"/>
+            <a:r>
+              <a:rPr lang="en-US" sz="1600" dirty="0">
+                <a:solidFill>
+                  <a:schemeClr val="bg1"/>
+                </a:solidFill>
+              </a:rPr>
+              <a:t>Reporting</a:t>
+            </a:r>
+          </a:p>
+          <a:p>
+            <a:pPr algn="ctr"/>
+            <a:endParaRPr lang="en-US" sz="2000" dirty="0"/>
+          </a:p>
+        </p:txBody>
+      </p:sp>
+      <p:sp>
+        <p:nvSpPr>
+          <p:cNvPr id="18" name="CasellaDiTesto 17">
+            <a:extLst>
+              <a:ext uri="{FF2B5EF4-FFF2-40B4-BE49-F238E27FC236}">
+                <a16:creationId xmlns:a16="http://schemas.microsoft.com/office/drawing/2014/main" id="{C3385FED-9A38-C240-40AC-A832F0726167}"/>
+              </a:ext>
+            </a:extLst>
+          </p:cNvPr>
+          <p:cNvSpPr txBox="1"/>
+          <p:nvPr/>
+        </p:nvSpPr>
+        <p:spPr>
+          <a:xfrm>
+            <a:off x="2564295" y="3988930"/>
+            <a:ext cx="1274899" cy="892552"/>
+          </a:xfrm>
+          <a:prstGeom prst="rect">
+            <a:avLst/>
+          </a:prstGeom>
+          <a:noFill/>
+        </p:spPr>
+        <p:txBody>
+          <a:bodyPr wrap="square" rtlCol="0">
+            <a:spAutoFit/>
+          </a:bodyPr>
+          <a:lstStyle/>
+          <a:p>
+            <a:pPr algn="ctr"/>
+            <a:r>
+              <a:rPr lang="en-US" sz="1600" dirty="0">
+                <a:solidFill>
+                  <a:schemeClr val="bg1"/>
+                </a:solidFill>
+              </a:rPr>
+              <a:t>Process control</a:t>
+            </a:r>
+          </a:p>
+          <a:p>
+            <a:pPr algn="ctr"/>
+            <a:endParaRPr lang="en-US" sz="2000" dirty="0"/>
+          </a:p>
+        </p:txBody>
+      </p:sp>
+      <p:pic>
+        <p:nvPicPr>
+          <p:cNvPr id="20" name="Immagine 19" descr="Immagine che contiene clipart, Elementi grafici, schermata, design&#10;&#10;Descrizione generata automaticamente">
+            <a:extLst>
+              <a:ext uri="{FF2B5EF4-FFF2-40B4-BE49-F238E27FC236}">
+                <a16:creationId xmlns:a16="http://schemas.microsoft.com/office/drawing/2014/main" id="{72EAC76B-5BFE-97E7-4A36-C2D0F8E62BD4}"/>
+              </a:ext>
+            </a:extLst>
+          </p:cNvPr>
+          <p:cNvPicPr>
+            <a:picLocks noChangeAspect="1"/>
+          </p:cNvPicPr>
+          <p:nvPr/>
+        </p:nvPicPr>
+        <p:blipFill>
+          <a:blip r:embed="rId6">
+            <a:extLst>
+              <a:ext uri="{28A0092B-C50C-407E-A947-70E740481C1C}">
+                <a14:useLocalDpi xmlns:a14="http://schemas.microsoft.com/office/drawing/2010/main" val="0"/>
+              </a:ext>
+            </a:extLst>
+          </a:blip>
+          <a:stretch>
+            <a:fillRect/>
+          </a:stretch>
+        </p:blipFill>
+        <p:spPr>
+          <a:xfrm>
+            <a:off x="6131994" y="2617625"/>
+            <a:ext cx="938646" cy="938646"/>
+          </a:xfrm>
+          <a:prstGeom prst="rect">
+            <a:avLst/>
+          </a:prstGeom>
+        </p:spPr>
+      </p:pic>
+      <p:sp>
+        <p:nvSpPr>
+          <p:cNvPr id="21" name="CasellaDiTesto 20">
+            <a:extLst>
+              <a:ext uri="{FF2B5EF4-FFF2-40B4-BE49-F238E27FC236}">
+                <a16:creationId xmlns:a16="http://schemas.microsoft.com/office/drawing/2014/main" id="{B216C25E-F4C4-CA29-3C3C-3FD8209C697E}"/>
+              </a:ext>
+            </a:extLst>
+          </p:cNvPr>
+          <p:cNvSpPr txBox="1"/>
+          <p:nvPr/>
+        </p:nvSpPr>
+        <p:spPr>
+          <a:xfrm>
+            <a:off x="5978434" y="4016643"/>
+            <a:ext cx="1274899" cy="892552"/>
+          </a:xfrm>
+          <a:prstGeom prst="rect">
+            <a:avLst/>
+          </a:prstGeom>
+          <a:noFill/>
+        </p:spPr>
+        <p:txBody>
+          <a:bodyPr wrap="square" rtlCol="0">
+            <a:spAutoFit/>
+          </a:bodyPr>
+          <a:lstStyle/>
+          <a:p>
+            <a:pPr algn="ctr"/>
+            <a:r>
+              <a:rPr lang="en-US" sz="1600" dirty="0">
+                <a:solidFill>
+                  <a:schemeClr val="bg1"/>
+                </a:solidFill>
+              </a:rPr>
+              <a:t>Alarms and notifications</a:t>
+            </a:r>
+          </a:p>
+          <a:p>
+            <a:pPr algn="ctr"/>
+            <a:endParaRPr lang="en-US" sz="2000" dirty="0"/>
+          </a:p>
+        </p:txBody>
+      </p:sp>
+      <p:pic>
+        <p:nvPicPr>
+          <p:cNvPr id="23" name="Immagine 22" descr="Immagine che contiene simbolo, Elementi grafici, Carattere, logo&#10;&#10;Descrizione generata automaticamente">
+            <a:extLst>
+              <a:ext uri="{FF2B5EF4-FFF2-40B4-BE49-F238E27FC236}">
+                <a16:creationId xmlns:a16="http://schemas.microsoft.com/office/drawing/2014/main" id="{C2007D69-08E7-E398-36BB-DC21B7B5294A}"/>
+              </a:ext>
+            </a:extLst>
+          </p:cNvPr>
+          <p:cNvPicPr>
+            <a:picLocks noChangeAspect="1"/>
+          </p:cNvPicPr>
+          <p:nvPr/>
+        </p:nvPicPr>
+        <p:blipFill>
+          <a:blip r:embed="rId7">
+            <a:extLst>
+              <a:ext uri="{28A0092B-C50C-407E-A947-70E740481C1C}">
+                <a14:useLocalDpi xmlns:a14="http://schemas.microsoft.com/office/drawing/2010/main" val="0"/>
+              </a:ext>
+            </a:extLst>
+          </a:blip>
+          <a:stretch>
+            <a:fillRect/>
+          </a:stretch>
+        </p:blipFill>
+        <p:spPr>
+          <a:xfrm>
+            <a:off x="4224473" y="2477564"/>
+            <a:ext cx="1207088" cy="1207088"/>
+          </a:xfrm>
+          <a:prstGeom prst="rect">
+            <a:avLst/>
+          </a:prstGeom>
+        </p:spPr>
+      </p:pic>
+      <p:sp>
+        <p:nvSpPr>
+          <p:cNvPr id="24" name="CasellaDiTesto 23">
+            <a:extLst>
+              <a:ext uri="{FF2B5EF4-FFF2-40B4-BE49-F238E27FC236}">
+                <a16:creationId xmlns:a16="http://schemas.microsoft.com/office/drawing/2014/main" id="{FAF9E16A-4713-1E58-CBDC-783DBE1EE17F}"/>
+              </a:ext>
+            </a:extLst>
+          </p:cNvPr>
+          <p:cNvSpPr txBox="1"/>
+          <p:nvPr/>
+        </p:nvSpPr>
+        <p:spPr>
+          <a:xfrm>
+            <a:off x="4211988" y="4016643"/>
+            <a:ext cx="1274899" cy="892552"/>
+          </a:xfrm>
+          <a:prstGeom prst="rect">
+            <a:avLst/>
+          </a:prstGeom>
+          <a:noFill/>
+        </p:spPr>
+        <p:txBody>
+          <a:bodyPr wrap="square" rtlCol="0">
+            <a:spAutoFit/>
+          </a:bodyPr>
+          <a:lstStyle/>
+          <a:p>
+            <a:pPr algn="ctr"/>
+            <a:r>
+              <a:rPr lang="en-US" sz="1600" dirty="0">
+                <a:solidFill>
+                  <a:schemeClr val="bg1"/>
+                </a:solidFill>
+              </a:rPr>
+              <a:t>Plant status monitoring</a:t>
+            </a:r>
+          </a:p>
+          <a:p>
+            <a:pPr algn="ctr"/>
+            <a:endParaRPr lang="en-US" sz="2000" dirty="0"/>
+          </a:p>
+        </p:txBody>
+      </p:sp>
+      <p:pic>
+        <p:nvPicPr>
+          <p:cNvPr id="26" name="Immagine 25" descr="Immagine che contiene clipart, schermata, Elementi grafici, design&#10;&#10;Descrizione generata automaticamente">
+            <a:extLst>
+              <a:ext uri="{FF2B5EF4-FFF2-40B4-BE49-F238E27FC236}">
+                <a16:creationId xmlns:a16="http://schemas.microsoft.com/office/drawing/2014/main" id="{538B204C-E48D-8CB6-C619-BEF56A8F88E8}"/>
+              </a:ext>
+            </a:extLst>
+          </p:cNvPr>
+          <p:cNvPicPr>
+            <a:picLocks noChangeAspect="1"/>
+          </p:cNvPicPr>
+          <p:nvPr/>
+        </p:nvPicPr>
+        <p:blipFill>
+          <a:blip r:embed="rId8">
+            <a:extLst>
+              <a:ext uri="{28A0092B-C50C-407E-A947-70E740481C1C}">
+                <a14:useLocalDpi xmlns:a14="http://schemas.microsoft.com/office/drawing/2010/main" val="0"/>
+              </a:ext>
+            </a:extLst>
+          </a:blip>
+          <a:stretch>
+            <a:fillRect/>
+          </a:stretch>
+        </p:blipFill>
+        <p:spPr>
+          <a:xfrm>
+            <a:off x="895577" y="2477564"/>
+            <a:ext cx="1078707" cy="1078707"/>
+          </a:xfrm>
+          <a:prstGeom prst="rect">
+            <a:avLst/>
+          </a:prstGeom>
+        </p:spPr>
+      </p:pic>
+      <p:sp>
+        <p:nvSpPr>
+          <p:cNvPr id="27" name="CasellaDiTesto 26">
+            <a:extLst>
+              <a:ext uri="{FF2B5EF4-FFF2-40B4-BE49-F238E27FC236}">
+                <a16:creationId xmlns:a16="http://schemas.microsoft.com/office/drawing/2014/main" id="{AB48ADB8-5F40-2192-97E9-EE074A178760}"/>
+              </a:ext>
+            </a:extLst>
+          </p:cNvPr>
+          <p:cNvSpPr txBox="1"/>
+          <p:nvPr/>
+        </p:nvSpPr>
+        <p:spPr>
+          <a:xfrm>
+            <a:off x="828554" y="4010957"/>
+            <a:ext cx="1274899" cy="892552"/>
+          </a:xfrm>
+          <a:prstGeom prst="rect">
+            <a:avLst/>
+          </a:prstGeom>
+          <a:noFill/>
+        </p:spPr>
+        <p:txBody>
+          <a:bodyPr wrap="square" rtlCol="0">
+            <a:spAutoFit/>
+          </a:bodyPr>
+          <a:lstStyle/>
+          <a:p>
+            <a:pPr algn="ctr"/>
+            <a:r>
+              <a:rPr lang="en-US" sz="1600" dirty="0">
+                <a:solidFill>
+                  <a:schemeClr val="bg1"/>
+                </a:solidFill>
+              </a:rPr>
+              <a:t>Production scheduling</a:t>
+            </a:r>
+          </a:p>
+          <a:p>
+            <a:pPr algn="ctr"/>
+            <a:endParaRPr lang="en-US" sz="2000" dirty="0"/>
+          </a:p>
+        </p:txBody>
+      </p:sp>
+      <p:pic>
+        <p:nvPicPr>
+          <p:cNvPr id="29" name="Immagine 28" descr="Immagine che contiene schermata, Elementi grafici, grafica, Policromia&#10;&#10;Descrizione generata automaticamente">
+            <a:extLst>
+              <a:ext uri="{FF2B5EF4-FFF2-40B4-BE49-F238E27FC236}">
+                <a16:creationId xmlns:a16="http://schemas.microsoft.com/office/drawing/2014/main" id="{8823B4D4-9678-2A5A-DE1A-F0640AFF2DF6}"/>
+              </a:ext>
+            </a:extLst>
+          </p:cNvPr>
+          <p:cNvPicPr>
+            <a:picLocks noChangeAspect="1"/>
+          </p:cNvPicPr>
+          <p:nvPr/>
+        </p:nvPicPr>
+        <p:blipFill>
+          <a:blip r:embed="rId9">
+            <a:extLst>
+              <a:ext uri="{28A0092B-C50C-407E-A947-70E740481C1C}">
+                <a14:useLocalDpi xmlns:a14="http://schemas.microsoft.com/office/drawing/2010/main" val="0"/>
+              </a:ext>
+            </a:extLst>
+          </a:blip>
+          <a:stretch>
+            <a:fillRect/>
+          </a:stretch>
+        </p:blipFill>
+        <p:spPr>
+          <a:xfrm>
+            <a:off x="7784034" y="2426546"/>
+            <a:ext cx="1180742" cy="1180742"/>
+          </a:xfrm>
+          <a:prstGeom prst="rect">
+            <a:avLst/>
+          </a:prstGeom>
+        </p:spPr>
+      </p:pic>
+      <p:sp>
+        <p:nvSpPr>
+          <p:cNvPr id="30" name="CasellaDiTesto 29">
+            <a:extLst>
+              <a:ext uri="{FF2B5EF4-FFF2-40B4-BE49-F238E27FC236}">
+                <a16:creationId xmlns:a16="http://schemas.microsoft.com/office/drawing/2014/main" id="{E59BD826-AE0A-3EFB-B34F-02D53EC33A0E}"/>
+              </a:ext>
+            </a:extLst>
+          </p:cNvPr>
+          <p:cNvSpPr txBox="1"/>
+          <p:nvPr/>
+        </p:nvSpPr>
+        <p:spPr>
+          <a:xfrm>
+            <a:off x="7736956" y="3983106"/>
+            <a:ext cx="1274899" cy="892552"/>
+          </a:xfrm>
+          <a:prstGeom prst="rect">
+            <a:avLst/>
+          </a:prstGeom>
+          <a:noFill/>
+        </p:spPr>
+        <p:txBody>
+          <a:bodyPr wrap="square" rtlCol="0">
+            <a:spAutoFit/>
+          </a:bodyPr>
+          <a:lstStyle/>
+          <a:p>
+            <a:pPr algn="ctr"/>
+            <a:r>
+              <a:rPr lang="en-US" sz="1600" dirty="0">
+                <a:solidFill>
+                  <a:schemeClr val="bg1"/>
+                </a:solidFill>
+              </a:rPr>
+              <a:t>Data collection</a:t>
+            </a:r>
+          </a:p>
+          <a:p>
+            <a:pPr algn="ctr"/>
+            <a:endParaRPr lang="en-US" sz="2000" dirty="0"/>
+          </a:p>
+        </p:txBody>
+      </p:sp>
+    </p:spTree>
+    <p:extLst>
+      <p:ext uri="{BB962C8B-B14F-4D97-AF65-F5344CB8AC3E}">
+        <p14:creationId xmlns:p14="http://schemas.microsoft.com/office/powerpoint/2010/main" val="363269156"/>
+      </p:ext>
+    </p:extLst>
+  </p:cSld>
+  <p:clrMapOvr>
+    <a:masterClrMapping/>
+  </p:clrMapOvr>
+</p:sld>
+</file>
+
+<file path=ppt/slides/slide5.xml><?xml version="1.0" encoding="utf-8"?>
+<p:sld xmlns:a="http://schemas.openxmlformats.org/drawingml/2006/main" xmlns:r="http://schemas.openxmlformats.org/officeDocument/2006/relationships" xmlns:p="http://schemas.openxmlformats.org/presentationml/2006/main">
+  <p:cSld>
+    <p:spTree>
+      <p:nvGrpSpPr>
+        <p:cNvPr id="1" name=""/>
+        <p:cNvGrpSpPr/>
+        <p:nvPr/>
+      </p:nvGrpSpPr>
+      <p:grpSpPr>
+        <a:xfrm>
+          <a:off x="0" y="0"/>
+          <a:ext cx="0" cy="0"/>
+          <a:chOff x="0" y="0"/>
+          <a:chExt cx="0" cy="0"/>
+        </a:xfrm>
+      </p:grpSpPr>
+      <p:sp>
+        <p:nvSpPr>
+          <p:cNvPr id="3" name="Titolo 2">
+            <a:extLst>
+              <a:ext uri="{FF2B5EF4-FFF2-40B4-BE49-F238E27FC236}">
+                <a16:creationId xmlns:a16="http://schemas.microsoft.com/office/drawing/2014/main" id="{1353F689-2E51-BF4F-AE47-7CEB7CC4C52A}"/>
+              </a:ext>
+            </a:extLst>
+          </p:cNvPr>
+          <p:cNvSpPr>
+            <a:spLocks noGrp="1"/>
+          </p:cNvSpPr>
+          <p:nvPr>
+            <p:ph type="title"/>
+          </p:nvPr>
+        </p:nvSpPr>
+        <p:spPr>
+          <a:xfrm>
+            <a:off x="964023" y="879063"/>
+            <a:ext cx="9290320" cy="610863"/>
+          </a:xfrm>
+        </p:spPr>
+        <p:txBody>
+          <a:bodyPr rtlCol="0">
+            <a:normAutofit/>
+          </a:bodyPr>
+          <a:lstStyle/>
+          <a:p>
+            <a:pPr rtl="0"/>
+            <a:r>
+              <a:rPr lang="it-IT" dirty="0"/>
+              <a:t>System features</a:t>
+            </a:r>
+          </a:p>
+        </p:txBody>
+      </p:sp>
+      <p:sp>
+        <p:nvSpPr>
+          <p:cNvPr id="7" name="Segnaposto numero diapositiva 6">
+            <a:extLst>
+              <a:ext uri="{FF2B5EF4-FFF2-40B4-BE49-F238E27FC236}">
+                <a16:creationId xmlns:a16="http://schemas.microsoft.com/office/drawing/2014/main" id="{F37669F0-EA6D-6B46-AF0E-A9C2D1F223DB}"/>
+              </a:ext>
+            </a:extLst>
+          </p:cNvPr>
+          <p:cNvSpPr>
+            <a:spLocks noGrp="1"/>
+          </p:cNvSpPr>
+          <p:nvPr>
+            <p:ph type="sldNum" sz="quarter" idx="16"/>
+          </p:nvPr>
+        </p:nvSpPr>
+        <p:spPr>
+          <a:xfrm>
+            <a:off x="971550" y="6332220"/>
+            <a:ext cx="523240" cy="247651"/>
+          </a:xfrm>
+        </p:spPr>
+        <p:txBody>
+          <a:bodyPr rtlCol="0"/>
+          <a:lstStyle/>
+          <a:p>
+            <a:pPr rtl="0"/>
+            <a:fld id="{294A09A9-5501-47C1-A89A-A340965A2BE2}" type="slidenum">
+              <a:rPr lang="it-IT" smtClean="0"/>
+              <a:pPr rtl="0"/>
+              <a:t>5</a:t>
+            </a:fld>
+            <a:endParaRPr lang="it-IT"/>
+          </a:p>
+        </p:txBody>
+      </p:sp>
+      <p:sp>
+        <p:nvSpPr>
+          <p:cNvPr id="18" name="CasellaDiTesto 17">
+            <a:extLst>
+              <a:ext uri="{FF2B5EF4-FFF2-40B4-BE49-F238E27FC236}">
+                <a16:creationId xmlns:a16="http://schemas.microsoft.com/office/drawing/2014/main" id="{C3385FED-9A38-C240-40AC-A832F0726167}"/>
+              </a:ext>
+            </a:extLst>
+          </p:cNvPr>
+          <p:cNvSpPr txBox="1"/>
+          <p:nvPr/>
+        </p:nvSpPr>
+        <p:spPr>
+          <a:xfrm>
+            <a:off x="2634468" y="4053358"/>
+            <a:ext cx="1274899" cy="892552"/>
+          </a:xfrm>
+          <a:prstGeom prst="rect">
+            <a:avLst/>
+          </a:prstGeom>
+          <a:noFill/>
+        </p:spPr>
+        <p:txBody>
+          <a:bodyPr wrap="square" rtlCol="0">
+            <a:spAutoFit/>
+          </a:bodyPr>
+          <a:lstStyle/>
+          <a:p>
+            <a:pPr algn="ctr"/>
+            <a:r>
+              <a:rPr lang="en-US" sz="1600" dirty="0">
+                <a:solidFill>
+                  <a:schemeClr val="bg1"/>
+                </a:solidFill>
+              </a:rPr>
+              <a:t>Admin dashboard</a:t>
+            </a:r>
+          </a:p>
+          <a:p>
+            <a:pPr algn="ctr"/>
+            <a:endParaRPr lang="en-US" sz="2000" dirty="0"/>
+          </a:p>
+        </p:txBody>
+      </p:sp>
+      <p:sp>
+        <p:nvSpPr>
+          <p:cNvPr id="21" name="CasellaDiTesto 20">
+            <a:extLst>
+              <a:ext uri="{FF2B5EF4-FFF2-40B4-BE49-F238E27FC236}">
+                <a16:creationId xmlns:a16="http://schemas.microsoft.com/office/drawing/2014/main" id="{B216C25E-F4C4-CA29-3C3C-3FD8209C697E}"/>
+              </a:ext>
+            </a:extLst>
+          </p:cNvPr>
+          <p:cNvSpPr txBox="1"/>
+          <p:nvPr/>
+        </p:nvSpPr>
+        <p:spPr>
+          <a:xfrm>
+            <a:off x="6294520" y="4038649"/>
+            <a:ext cx="1274899" cy="1138773"/>
+          </a:xfrm>
+          <a:prstGeom prst="rect">
+            <a:avLst/>
+          </a:prstGeom>
+          <a:noFill/>
+        </p:spPr>
+        <p:txBody>
+          <a:bodyPr wrap="square" rtlCol="0">
+            <a:spAutoFit/>
+          </a:bodyPr>
+          <a:lstStyle/>
+          <a:p>
+            <a:pPr algn="ctr"/>
+            <a:r>
+              <a:rPr lang="en-US" sz="1600" dirty="0">
+                <a:solidFill>
+                  <a:schemeClr val="bg1"/>
+                </a:solidFill>
+              </a:rPr>
+              <a:t>Simplified updates deployment</a:t>
+            </a:r>
+          </a:p>
+          <a:p>
+            <a:pPr algn="ctr"/>
+            <a:endParaRPr lang="en-US" sz="2000" dirty="0"/>
+          </a:p>
+        </p:txBody>
+      </p:sp>
+      <p:sp>
+        <p:nvSpPr>
+          <p:cNvPr id="24" name="CasellaDiTesto 23">
+            <a:extLst>
+              <a:ext uri="{FF2B5EF4-FFF2-40B4-BE49-F238E27FC236}">
+                <a16:creationId xmlns:a16="http://schemas.microsoft.com/office/drawing/2014/main" id="{FAF9E16A-4713-1E58-CBDC-783DBE1EE17F}"/>
+              </a:ext>
+            </a:extLst>
+          </p:cNvPr>
+          <p:cNvSpPr txBox="1"/>
+          <p:nvPr/>
+        </p:nvSpPr>
+        <p:spPr>
+          <a:xfrm>
+            <a:off x="4498679" y="4010798"/>
+            <a:ext cx="1274899" cy="830997"/>
+          </a:xfrm>
+          <a:prstGeom prst="rect">
+            <a:avLst/>
+          </a:prstGeom>
+          <a:noFill/>
+        </p:spPr>
+        <p:txBody>
+          <a:bodyPr wrap="square" rtlCol="0">
+            <a:spAutoFit/>
+          </a:bodyPr>
+          <a:lstStyle/>
+          <a:p>
+            <a:pPr algn="ctr"/>
+            <a:r>
+              <a:rPr lang="en-US" sz="1600" dirty="0">
+                <a:solidFill>
+                  <a:schemeClr val="bg1"/>
+                </a:solidFill>
+              </a:rPr>
+              <a:t>Client connections monitoring</a:t>
+            </a:r>
+            <a:endParaRPr lang="en-US" sz="2000" dirty="0"/>
+          </a:p>
+        </p:txBody>
+      </p:sp>
+      <p:sp>
+        <p:nvSpPr>
+          <p:cNvPr id="27" name="CasellaDiTesto 26">
+            <a:extLst>
+              <a:ext uri="{FF2B5EF4-FFF2-40B4-BE49-F238E27FC236}">
+                <a16:creationId xmlns:a16="http://schemas.microsoft.com/office/drawing/2014/main" id="{AB48ADB8-5F40-2192-97E9-EE074A178760}"/>
+              </a:ext>
+            </a:extLst>
+          </p:cNvPr>
+          <p:cNvSpPr txBox="1"/>
+          <p:nvPr/>
+        </p:nvSpPr>
+        <p:spPr>
+          <a:xfrm>
+            <a:off x="857341" y="4010957"/>
+            <a:ext cx="1274899" cy="1138773"/>
+          </a:xfrm>
+          <a:prstGeom prst="rect">
+            <a:avLst/>
+          </a:prstGeom>
+          <a:noFill/>
+        </p:spPr>
+        <p:txBody>
+          <a:bodyPr wrap="square" rtlCol="0">
+            <a:spAutoFit/>
+          </a:bodyPr>
+          <a:lstStyle/>
+          <a:p>
+            <a:pPr algn="ctr"/>
+            <a:r>
+              <a:rPr lang="en-US" sz="1600" dirty="0">
+                <a:solidFill>
+                  <a:schemeClr val="bg1"/>
+                </a:solidFill>
+              </a:rPr>
+              <a:t>Advanced system logging</a:t>
+            </a:r>
+          </a:p>
+          <a:p>
+            <a:pPr algn="ctr"/>
+            <a:endParaRPr lang="en-US" sz="2000" dirty="0"/>
+          </a:p>
+        </p:txBody>
+      </p:sp>
+      <p:pic>
+        <p:nvPicPr>
+          <p:cNvPr id="5" name="Immagine 4" descr="Immagine che contiene schermata, Elementi grafici, testo, Carattere&#10;&#10;Descrizione generata automaticamente">
+            <a:extLst>
+              <a:ext uri="{FF2B5EF4-FFF2-40B4-BE49-F238E27FC236}">
+                <a16:creationId xmlns:a16="http://schemas.microsoft.com/office/drawing/2014/main" id="{07805A16-96B6-CE63-7982-6E7D6DE8636E}"/>
+              </a:ext>
+            </a:extLst>
+          </p:cNvPr>
+          <p:cNvPicPr>
+            <a:picLocks noChangeAspect="1"/>
+          </p:cNvPicPr>
+          <p:nvPr/>
+        </p:nvPicPr>
+        <p:blipFill>
+          <a:blip r:embed="rId3">
+            <a:extLst>
+              <a:ext uri="{28A0092B-C50C-407E-A947-70E740481C1C}">
+                <a14:useLocalDpi xmlns:a14="http://schemas.microsoft.com/office/drawing/2010/main" val="0"/>
+              </a:ext>
+            </a:extLst>
+          </a:blip>
+          <a:stretch>
+            <a:fillRect/>
+          </a:stretch>
+        </p:blipFill>
+        <p:spPr>
+          <a:xfrm>
+            <a:off x="1048514" y="2847043"/>
+            <a:ext cx="892552" cy="892552"/>
+          </a:xfrm>
+          <a:prstGeom prst="rect">
+            <a:avLst/>
+          </a:prstGeom>
+        </p:spPr>
+      </p:pic>
+      <p:pic>
+        <p:nvPicPr>
+          <p:cNvPr id="9" name="Immagine 8" descr="Immagine che contiene schermata, Rettangolo, design&#10;&#10;Descrizione generata automaticamente">
+            <a:extLst>
+              <a:ext uri="{FF2B5EF4-FFF2-40B4-BE49-F238E27FC236}">
+                <a16:creationId xmlns:a16="http://schemas.microsoft.com/office/drawing/2014/main" id="{647236EF-44DE-339C-E73A-CA6089152473}"/>
+              </a:ext>
+            </a:extLst>
+          </p:cNvPr>
+          <p:cNvPicPr>
+            <a:picLocks noChangeAspect="1"/>
+          </p:cNvPicPr>
+          <p:nvPr/>
+        </p:nvPicPr>
+        <p:blipFill>
+          <a:blip r:embed="rId4">
+            <a:extLst>
+              <a:ext uri="{28A0092B-C50C-407E-A947-70E740481C1C}">
+                <a14:useLocalDpi xmlns:a14="http://schemas.microsoft.com/office/drawing/2010/main" val="0"/>
+              </a:ext>
+            </a:extLst>
+          </a:blip>
+          <a:stretch>
+            <a:fillRect/>
+          </a:stretch>
+        </p:blipFill>
+        <p:spPr>
+          <a:xfrm>
+            <a:off x="2728778" y="2832186"/>
+            <a:ext cx="1108212" cy="1108212"/>
+          </a:xfrm>
+          <a:prstGeom prst="rect">
+            <a:avLst/>
+          </a:prstGeom>
+        </p:spPr>
+      </p:pic>
+      <p:pic>
+        <p:nvPicPr>
+          <p:cNvPr id="11" name="Immagine 10" descr="Immagine che contiene clipart, schermata, cartone animato, design&#10;&#10;Descrizione generata automaticamente">
+            <a:extLst>
+              <a:ext uri="{FF2B5EF4-FFF2-40B4-BE49-F238E27FC236}">
+                <a16:creationId xmlns:a16="http://schemas.microsoft.com/office/drawing/2014/main" id="{3679B64A-7CE1-023F-5BD9-B78ADAC9215B}"/>
+              </a:ext>
+            </a:extLst>
+          </p:cNvPr>
+          <p:cNvPicPr>
+            <a:picLocks noChangeAspect="1"/>
+          </p:cNvPicPr>
+          <p:nvPr/>
+        </p:nvPicPr>
+        <p:blipFill>
+          <a:blip r:embed="rId5">
+            <a:extLst>
+              <a:ext uri="{28A0092B-C50C-407E-A947-70E740481C1C}">
+                <a14:useLocalDpi xmlns:a14="http://schemas.microsoft.com/office/drawing/2010/main" val="0"/>
+              </a:ext>
+            </a:extLst>
+          </a:blip>
+          <a:stretch>
+            <a:fillRect/>
+          </a:stretch>
+        </p:blipFill>
+        <p:spPr>
+          <a:xfrm>
+            <a:off x="4650371" y="2847043"/>
+            <a:ext cx="1022796" cy="1022796"/>
+          </a:xfrm>
+          <a:prstGeom prst="rect">
+            <a:avLst/>
+          </a:prstGeom>
+        </p:spPr>
+      </p:pic>
+      <p:sp>
+        <p:nvSpPr>
+          <p:cNvPr id="12" name="CasellaDiTesto 11">
+            <a:extLst>
+              <a:ext uri="{FF2B5EF4-FFF2-40B4-BE49-F238E27FC236}">
+                <a16:creationId xmlns:a16="http://schemas.microsoft.com/office/drawing/2014/main" id="{F9873AFD-A44C-B46F-25FF-9B980CAF93B3}"/>
+              </a:ext>
+            </a:extLst>
+          </p:cNvPr>
+          <p:cNvSpPr txBox="1"/>
+          <p:nvPr/>
+        </p:nvSpPr>
+        <p:spPr>
+          <a:xfrm>
+            <a:off x="8173965" y="4081357"/>
+            <a:ext cx="1598044" cy="1138773"/>
+          </a:xfrm>
+          <a:prstGeom prst="rect">
+            <a:avLst/>
+          </a:prstGeom>
+          <a:noFill/>
+        </p:spPr>
+        <p:txBody>
+          <a:bodyPr wrap="square" rtlCol="0">
+            <a:spAutoFit/>
+          </a:bodyPr>
+          <a:lstStyle/>
+          <a:p>
+            <a:pPr algn="ctr"/>
+            <a:r>
+              <a:rPr lang="en-US" sz="1600" dirty="0">
+                <a:solidFill>
+                  <a:schemeClr val="bg1"/>
+                </a:solidFill>
+              </a:rPr>
+              <a:t>Advanced users and roles management</a:t>
+            </a:r>
+          </a:p>
+          <a:p>
+            <a:pPr algn="ctr"/>
+            <a:endParaRPr lang="en-US" sz="2000" dirty="0"/>
+          </a:p>
+        </p:txBody>
+      </p:sp>
+      <p:pic>
+        <p:nvPicPr>
+          <p:cNvPr id="1028" name="Picture 4" descr="Deployment - Free computer icons">
+            <a:extLst>
+              <a:ext uri="{FF2B5EF4-FFF2-40B4-BE49-F238E27FC236}">
+                <a16:creationId xmlns:a16="http://schemas.microsoft.com/office/drawing/2014/main" id="{A0D83C16-C425-E485-859F-6AB63DF92E38}"/>
+              </a:ext>
+            </a:extLst>
+          </p:cNvPr>
+          <p:cNvPicPr>
+            <a:picLocks noChangeAspect="1" noChangeArrowheads="1"/>
+          </p:cNvPicPr>
+          <p:nvPr/>
+        </p:nvPicPr>
+        <p:blipFill>
+          <a:blip r:embed="rId6">
+            <a:extLst>
+              <a:ext uri="{28A0092B-C50C-407E-A947-70E740481C1C}">
+                <a14:useLocalDpi xmlns:a14="http://schemas.microsoft.com/office/drawing/2010/main" val="0"/>
+              </a:ext>
+            </a:extLst>
+          </a:blip>
+          <a:srcRect/>
+          <a:stretch>
+            <a:fillRect/>
+          </a:stretch>
+        </p:blipFill>
+        <p:spPr bwMode="auto">
+          <a:xfrm>
+            <a:off x="6347942" y="2832186"/>
+            <a:ext cx="1022796" cy="1022796"/>
+          </a:xfrm>
+          <a:prstGeom prst="rect">
+            <a:avLst/>
+          </a:prstGeom>
+          <a:noFill/>
+          <a:extLst>
+            <a:ext uri="{909E8E84-426E-40DD-AFC4-6F175D3DCCD1}">
+              <a14:hiddenFill xmlns:a14="http://schemas.microsoft.com/office/drawing/2010/main">
+                <a:solidFill>
+                  <a:srgbClr val="FFFFFF"/>
+                </a:solidFill>
+              </a14:hiddenFill>
+            </a:ext>
+          </a:extLst>
+        </p:spPr>
+      </p:pic>
+      <p:pic>
+        <p:nvPicPr>
+          <p:cNvPr id="1032" name="Picture 8" descr="Management - Free people icons">
+            <a:extLst>
+              <a:ext uri="{FF2B5EF4-FFF2-40B4-BE49-F238E27FC236}">
+                <a16:creationId xmlns:a16="http://schemas.microsoft.com/office/drawing/2014/main" id="{1696C669-1898-831C-35DB-2FF30C9C2485}"/>
+              </a:ext>
+            </a:extLst>
+          </p:cNvPr>
+          <p:cNvPicPr>
+            <a:picLocks noChangeAspect="1" noChangeArrowheads="1"/>
+          </p:cNvPicPr>
+          <p:nvPr/>
+        </p:nvPicPr>
+        <p:blipFill>
+          <a:blip r:embed="rId7">
+            <a:extLst>
+              <a:ext uri="{28A0092B-C50C-407E-A947-70E740481C1C}">
+                <a14:useLocalDpi xmlns:a14="http://schemas.microsoft.com/office/drawing/2010/main" val="0"/>
+              </a:ext>
+            </a:extLst>
+          </a:blip>
+          <a:srcRect/>
+          <a:stretch>
+            <a:fillRect/>
+          </a:stretch>
+        </p:blipFill>
+        <p:spPr bwMode="auto">
+          <a:xfrm>
+            <a:off x="8288002" y="2759715"/>
+            <a:ext cx="1180683" cy="1180683"/>
+          </a:xfrm>
+          <a:prstGeom prst="rect">
+            <a:avLst/>
+          </a:prstGeom>
+          <a:noFill/>
+          <a:extLst>
+            <a:ext uri="{909E8E84-426E-40DD-AFC4-6F175D3DCCD1}">
+              <a14:hiddenFill xmlns:a14="http://schemas.microsoft.com/office/drawing/2010/main">
+                <a:solidFill>
+                  <a:srgbClr val="FFFFFF"/>
+                </a:solidFill>
+              </a14:hiddenFill>
+            </a:ext>
+          </a:extLst>
+        </p:spPr>
+      </p:pic>
+      <p:sp>
+        <p:nvSpPr>
+          <p:cNvPr id="14" name="CasellaDiTesto 13">
+            <a:extLst>
+              <a:ext uri="{FF2B5EF4-FFF2-40B4-BE49-F238E27FC236}">
+                <a16:creationId xmlns:a16="http://schemas.microsoft.com/office/drawing/2014/main" id="{790AE474-52A8-F40F-DEB6-2C7DE9DC3E97}"/>
+              </a:ext>
+            </a:extLst>
+          </p:cNvPr>
+          <p:cNvSpPr txBox="1"/>
+          <p:nvPr/>
+        </p:nvSpPr>
+        <p:spPr>
+          <a:xfrm>
+            <a:off x="10331638" y="4030198"/>
+            <a:ext cx="1457629" cy="830997"/>
+          </a:xfrm>
+          <a:prstGeom prst="rect">
+            <a:avLst/>
+          </a:prstGeom>
+          <a:noFill/>
+        </p:spPr>
+        <p:txBody>
+          <a:bodyPr wrap="square" rtlCol="0">
+            <a:spAutoFit/>
+          </a:bodyPr>
+          <a:lstStyle/>
+          <a:p>
+            <a:pPr algn="ctr"/>
+            <a:r>
+              <a:rPr lang="en-US" sz="1600" dirty="0">
+                <a:solidFill>
+                  <a:schemeClr val="bg1"/>
+                </a:solidFill>
+              </a:rPr>
+              <a:t>Advanced system configuration</a:t>
+            </a:r>
+            <a:endParaRPr lang="en-US" sz="2000" dirty="0"/>
+          </a:p>
+        </p:txBody>
+      </p:sp>
+      <p:pic>
+        <p:nvPicPr>
+          <p:cNvPr id="1034" name="Picture 10" descr="system configuration Vector Icons free download in SVG, PNG Format">
+            <a:extLst>
+              <a:ext uri="{FF2B5EF4-FFF2-40B4-BE49-F238E27FC236}">
+                <a16:creationId xmlns:a16="http://schemas.microsoft.com/office/drawing/2014/main" id="{EDE39359-C439-CCB1-DA6E-C50930F4AE4A}"/>
+              </a:ext>
+            </a:extLst>
+          </p:cNvPr>
+          <p:cNvPicPr>
+            <a:picLocks noChangeAspect="1" noChangeArrowheads="1"/>
+          </p:cNvPicPr>
+          <p:nvPr/>
+        </p:nvPicPr>
+        <p:blipFill>
+          <a:blip r:embed="rId8">
+            <a:extLst>
+              <a:ext uri="{28A0092B-C50C-407E-A947-70E740481C1C}">
+                <a14:useLocalDpi xmlns:a14="http://schemas.microsoft.com/office/drawing/2010/main" val="0"/>
+              </a:ext>
+            </a:extLst>
+          </a:blip>
+          <a:srcRect/>
+          <a:stretch>
+            <a:fillRect/>
+          </a:stretch>
+        </p:blipFill>
+        <p:spPr bwMode="auto">
+          <a:xfrm>
+            <a:off x="10254343" y="2743572"/>
+            <a:ext cx="1477356" cy="1477356"/>
+          </a:xfrm>
+          <a:prstGeom prst="rect">
+            <a:avLst/>
+          </a:prstGeom>
+          <a:noFill/>
+          <a:extLst>
+            <a:ext uri="{909E8E84-426E-40DD-AFC4-6F175D3DCCD1}">
+              <a14:hiddenFill xmlns:a14="http://schemas.microsoft.com/office/drawing/2010/main">
+                <a:solidFill>
+                  <a:srgbClr val="FFFFFF"/>
+                </a:solidFill>
+              </a14:hiddenFill>
+            </a:ext>
+          </a:extLst>
+        </p:spPr>
+      </p:pic>
+    </p:spTree>
+    <p:extLst>
+      <p:ext uri="{BB962C8B-B14F-4D97-AF65-F5344CB8AC3E}">
+        <p14:creationId xmlns:p14="http://schemas.microsoft.com/office/powerpoint/2010/main" val="4115010457"/>
+      </p:ext>
+    </p:extLst>
+  </p:cSld>
+  <p:clrMapOvr>
+    <a:masterClrMapping/>
+  </p:clrMapOvr>
+</p:sld>
+</file>
+
+<file path=ppt/slides/slide6.xml><?xml version="1.0" encoding="utf-8"?>
 <p:sld xmlns:a="http://schemas.openxmlformats.org/drawingml/2006/main" xmlns:r="http://schemas.openxmlformats.org/officeDocument/2006/relationships" xmlns:p="http://schemas.openxmlformats.org/presentationml/2006/main">
   <p:cSld>
     <p:spTree>
@@ -14701,7 +16149,7 @@
             <a:fld id="{294A09A9-5501-47C1-A89A-A340965A2BE2}" type="slidenum">
               <a:rPr lang="it-IT" smtClean="0"/>
               <a:pPr rtl="0"/>
-              <a:t>4</a:t>
+              <a:t>6</a:t>
             </a:fld>
             <a:endParaRPr lang="it-IT" dirty="0"/>
           </a:p>
@@ -16290,21 +17738,21 @@
 </file>
 
 <file path=customXml/item2.xml><?xml version="1.0" encoding="utf-8"?>
+<p:properties xmlns:p="http://schemas.microsoft.com/office/2006/metadata/properties" xmlns:xsi="http://www.w3.org/2001/XMLSchema-instance" xmlns:pc="http://schemas.microsoft.com/office/infopath/2007/PartnerControls">
+  <documentManagement>
+    <Status xmlns="71af3243-3dd4-4a8d-8c0d-dd76da1f02a5">Not started</Status>
+    <MediaServiceKeyPoints xmlns="71af3243-3dd4-4a8d-8c0d-dd76da1f02a5" xsi:nil="true"/>
+  </documentManagement>
+</p:properties>
+</file>
+
+<file path=customXml/item3.xml><?xml version="1.0" encoding="utf-8"?>
 <?mso-contentType ?>
 <FormTemplates xmlns="http://schemas.microsoft.com/sharepoint/v3/contenttype/forms">
   <Display>DocumentLibraryForm</Display>
   <Edit>DocumentLibraryForm</Edit>
   <New>DocumentLibraryForm</New>
 </FormTemplates>
-</file>
-
-<file path=customXml/item3.xml><?xml version="1.0" encoding="utf-8"?>
-<p:properties xmlns:p="http://schemas.microsoft.com/office/2006/metadata/properties" xmlns:xsi="http://www.w3.org/2001/XMLSchema-instance" xmlns:pc="http://schemas.microsoft.com/office/infopath/2007/PartnerControls">
-  <documentManagement>
-    <Status xmlns="71af3243-3dd4-4a8d-8c0d-dd76da1f02a5">Not started</Status>
-    <MediaServiceKeyPoints xmlns="71af3243-3dd4-4a8d-8c0d-dd76da1f02a5" xsi:nil="true"/>
-  </documentManagement>
-</p:properties>
 </file>
 
 <file path=customXml/itemProps1.xml><?xml version="1.0" encoding="utf-8"?>
@@ -16327,14 +17775,6 @@
 </file>
 
 <file path=customXml/itemProps2.xml><?xml version="1.0" encoding="utf-8"?>
-<ds:datastoreItem xmlns:ds="http://schemas.openxmlformats.org/officeDocument/2006/customXml" ds:itemID="{1D20B6E4-879E-4E6C-BDE7-261540CD3765}">
-  <ds:schemaRefs>
-    <ds:schemaRef ds:uri="http://schemas.microsoft.com/sharepoint/v3/contenttype/forms"/>
-  </ds:schemaRefs>
-</ds:datastoreItem>
-</file>
-
-<file path=customXml/itemProps3.xml><?xml version="1.0" encoding="utf-8"?>
 <ds:datastoreItem xmlns:ds="http://schemas.openxmlformats.org/officeDocument/2006/customXml" ds:itemID="{09EC1AB0-9704-404D-B6D3-819D938AC55B}">
   <ds:schemaRefs>
     <ds:schemaRef ds:uri="http://schemas.microsoft.com/office/2006/metadata/properties"/>
@@ -16342,4 +17782,12 @@
     <ds:schemaRef ds:uri="71af3243-3dd4-4a8d-8c0d-dd76da1f02a5"/>
   </ds:schemaRefs>
 </ds:datastoreItem>
+</file>
+
+<file path=customXml/itemProps3.xml><?xml version="1.0" encoding="utf-8"?>
+<ds:datastoreItem xmlns:ds="http://schemas.openxmlformats.org/officeDocument/2006/customXml" ds:itemID="{1D20B6E4-879E-4E6C-BDE7-261540CD3765}">
+  <ds:schemaRefs>
+    <ds:schemaRef ds:uri="http://schemas.microsoft.com/sharepoint/v3/contenttype/forms"/>
+  </ds:schemaRefs>
+</ds:datastoreItem>
 </file>
</xml_diff>